<commit_message>
additional options for final project
</commit_message>
<xml_diff>
--- a/Labs/Final/Final-Project.pptx
+++ b/Labs/Final/Final-Project.pptx
@@ -10,6 +10,9 @@
     <p:sldId id="263" r:id="rId4"/>
     <p:sldId id="265" r:id="rId5"/>
     <p:sldId id="264" r:id="rId6"/>
+    <p:sldId id="266" r:id="rId7"/>
+    <p:sldId id="267" r:id="rId8"/>
+    <p:sldId id="268" r:id="rId9"/>
   </p:sldIdLst>
   <p:sldSz cx="12192000" cy="6858000"/>
   <p:notesSz cx="6858000" cy="9144000"/>
@@ -340,7 +343,7 @@
           <a:p>
             <a:fld id="{2F1234D3-356E-4AA1-875F-E36D1B269EC2}" type="datetimeFigureOut">
               <a:rPr lang="zh-TW" altLang="en-US" smtClean="0"/>
-              <a:t>2018/1/4</a:t>
+              <a:t>2018/1/11</a:t>
             </a:fld>
             <a:endParaRPr lang="zh-TW" altLang="en-US"/>
           </a:p>
@@ -672,7 +675,7 @@
           <a:p>
             <a:fld id="{2F1234D3-356E-4AA1-875F-E36D1B269EC2}" type="datetimeFigureOut">
               <a:rPr lang="zh-TW" altLang="en-US" smtClean="0"/>
-              <a:t>2018/1/4</a:t>
+              <a:t>2018/1/11</a:t>
             </a:fld>
             <a:endParaRPr lang="zh-TW" altLang="en-US"/>
           </a:p>
@@ -920,7 +923,7 @@
           <a:p>
             <a:fld id="{2F1234D3-356E-4AA1-875F-E36D1B269EC2}" type="datetimeFigureOut">
               <a:rPr lang="zh-TW" altLang="en-US" smtClean="0"/>
-              <a:t>2018/1/4</a:t>
+              <a:t>2018/1/11</a:t>
             </a:fld>
             <a:endParaRPr lang="zh-TW" altLang="en-US"/>
           </a:p>
@@ -1266,7 +1269,7 @@
           <a:p>
             <a:fld id="{2F1234D3-356E-4AA1-875F-E36D1B269EC2}" type="datetimeFigureOut">
               <a:rPr lang="zh-TW" altLang="en-US" smtClean="0"/>
-              <a:t>2018/1/4</a:t>
+              <a:t>2018/1/11</a:t>
             </a:fld>
             <a:endParaRPr lang="zh-TW" altLang="en-US"/>
           </a:p>
@@ -1620,7 +1623,7 @@
           <a:p>
             <a:fld id="{2F1234D3-356E-4AA1-875F-E36D1B269EC2}" type="datetimeFigureOut">
               <a:rPr lang="zh-TW" altLang="en-US" smtClean="0"/>
-              <a:t>2018/1/4</a:t>
+              <a:t>2018/1/11</a:t>
             </a:fld>
             <a:endParaRPr lang="zh-TW" altLang="en-US"/>
           </a:p>
@@ -1994,7 +1997,7 @@
           <a:p>
             <a:fld id="{2F1234D3-356E-4AA1-875F-E36D1B269EC2}" type="datetimeFigureOut">
               <a:rPr lang="zh-TW" altLang="en-US" smtClean="0"/>
-              <a:t>2018/1/4</a:t>
+              <a:t>2018/1/11</a:t>
             </a:fld>
             <a:endParaRPr lang="zh-TW" altLang="en-US"/>
           </a:p>
@@ -2471,7 +2474,7 @@
           <a:p>
             <a:fld id="{2F1234D3-356E-4AA1-875F-E36D1B269EC2}" type="datetimeFigureOut">
               <a:rPr lang="zh-TW" altLang="en-US" smtClean="0"/>
-              <a:t>2018/1/4</a:t>
+              <a:t>2018/1/11</a:t>
             </a:fld>
             <a:endParaRPr lang="zh-TW" altLang="en-US"/>
           </a:p>
@@ -2683,7 +2686,7 @@
           <a:p>
             <a:fld id="{2F1234D3-356E-4AA1-875F-E36D1B269EC2}" type="datetimeFigureOut">
               <a:rPr lang="zh-TW" altLang="en-US" smtClean="0"/>
-              <a:t>2018/1/4</a:t>
+              <a:t>2018/1/11</a:t>
             </a:fld>
             <a:endParaRPr lang="zh-TW" altLang="en-US"/>
           </a:p>
@@ -2901,7 +2904,7 @@
           <a:p>
             <a:fld id="{2F1234D3-356E-4AA1-875F-E36D1B269EC2}" type="datetimeFigureOut">
               <a:rPr lang="zh-TW" altLang="en-US" smtClean="0"/>
-              <a:t>2018/1/4</a:t>
+              <a:t>2018/1/11</a:t>
             </a:fld>
             <a:endParaRPr lang="zh-TW" altLang="en-US"/>
           </a:p>
@@ -3147,7 +3150,7 @@
           <a:p>
             <a:fld id="{2F1234D3-356E-4AA1-875F-E36D1B269EC2}" type="datetimeFigureOut">
               <a:rPr lang="zh-TW" altLang="en-US" smtClean="0"/>
-              <a:t>2018/1/4</a:t>
+              <a:t>2018/1/11</a:t>
             </a:fld>
             <a:endParaRPr lang="zh-TW" altLang="en-US"/>
           </a:p>
@@ -3395,7 +3398,7 @@
           <a:p>
             <a:fld id="{2F1234D3-356E-4AA1-875F-E36D1B269EC2}" type="datetimeFigureOut">
               <a:rPr lang="zh-TW" altLang="en-US" smtClean="0"/>
-              <a:t>2018/1/4</a:t>
+              <a:t>2018/1/11</a:t>
             </a:fld>
             <a:endParaRPr lang="zh-TW" altLang="en-US"/>
           </a:p>
@@ -3707,7 +3710,7 @@
           <a:p>
             <a:fld id="{2F1234D3-356E-4AA1-875F-E36D1B269EC2}" type="datetimeFigureOut">
               <a:rPr lang="zh-TW" altLang="en-US" smtClean="0"/>
-              <a:t>2018/1/4</a:t>
+              <a:t>2018/1/11</a:t>
             </a:fld>
             <a:endParaRPr lang="zh-TW" altLang="en-US"/>
           </a:p>
@@ -4089,7 +4092,7 @@
           <a:p>
             <a:fld id="{2F1234D3-356E-4AA1-875F-E36D1B269EC2}" type="datetimeFigureOut">
               <a:rPr lang="zh-TW" altLang="en-US" smtClean="0"/>
-              <a:t>2018/1/4</a:t>
+              <a:t>2018/1/11</a:t>
             </a:fld>
             <a:endParaRPr lang="zh-TW" altLang="en-US"/>
           </a:p>
@@ -4245,7 +4248,7 @@
           <a:p>
             <a:fld id="{2F1234D3-356E-4AA1-875F-E36D1B269EC2}" type="datetimeFigureOut">
               <a:rPr lang="zh-TW" altLang="en-US" smtClean="0"/>
-              <a:t>2018/1/4</a:t>
+              <a:t>2018/1/11</a:t>
             </a:fld>
             <a:endParaRPr lang="zh-TW" altLang="en-US"/>
           </a:p>
@@ -4378,7 +4381,7 @@
           <a:p>
             <a:fld id="{2F1234D3-356E-4AA1-875F-E36D1B269EC2}" type="datetimeFigureOut">
               <a:rPr lang="zh-TW" altLang="en-US" smtClean="0"/>
-              <a:t>2018/1/4</a:t>
+              <a:t>2018/1/11</a:t>
             </a:fld>
             <a:endParaRPr lang="zh-TW" altLang="en-US"/>
           </a:p>
@@ -4633,7 +4636,7 @@
           <a:p>
             <a:fld id="{2F1234D3-356E-4AA1-875F-E36D1B269EC2}" type="datetimeFigureOut">
               <a:rPr lang="zh-TW" altLang="en-US" smtClean="0"/>
-              <a:t>2018/1/4</a:t>
+              <a:t>2018/1/11</a:t>
             </a:fld>
             <a:endParaRPr lang="zh-TW" altLang="en-US"/>
           </a:p>
@@ -4955,7 +4958,7 @@
           <a:p>
             <a:fld id="{2F1234D3-356E-4AA1-875F-E36D1B269EC2}" type="datetimeFigureOut">
               <a:rPr lang="zh-TW" altLang="en-US" smtClean="0"/>
-              <a:t>2018/1/4</a:t>
+              <a:t>2018/1/11</a:t>
             </a:fld>
             <a:endParaRPr lang="zh-TW" altLang="en-US"/>
           </a:p>
@@ -5199,7 +5202,7 @@
           <a:p>
             <a:fld id="{2F1234D3-356E-4AA1-875F-E36D1B269EC2}" type="datetimeFigureOut">
               <a:rPr lang="zh-TW" altLang="en-US" smtClean="0"/>
-              <a:t>2018/1/4</a:t>
+              <a:t>2018/1/11</a:t>
             </a:fld>
             <a:endParaRPr lang="zh-TW" altLang="en-US"/>
           </a:p>
@@ -5848,11 +5851,7 @@
           <a:p>
             <a:r>
               <a:rPr lang="en-US" altLang="zh-TW" sz="3600" dirty="0" smtClean="0"/>
-              <a:t>Project : </a:t>
-            </a:r>
-            <a:r>
-              <a:rPr lang="en-US" altLang="zh-TW" sz="3600" dirty="0" smtClean="0"/>
-              <a:t>Games</a:t>
+              <a:t>Project : Games</a:t>
             </a:r>
             <a:endParaRPr lang="zh-TW" altLang="en-US" sz="3600" dirty="0"/>
           </a:p>
@@ -6170,7 +6169,7 @@
             </a:r>
             <a:r>
               <a:rPr lang="en-US" altLang="zh-TW" dirty="0" smtClean="0"/>
-              <a:t>(60)</a:t>
+              <a:t>(75)</a:t>
             </a:r>
             <a:endParaRPr lang="en-US" altLang="zh-TW" dirty="0"/>
           </a:p>
@@ -6392,7 +6391,15 @@
             </a:r>
             <a:r>
               <a:rPr lang="en-US" altLang="zh-TW" dirty="0" smtClean="0"/>
-              <a:t>: (70)</a:t>
+              <a:t>: </a:t>
+            </a:r>
+            <a:r>
+              <a:rPr lang="en-US" altLang="zh-TW" dirty="0" smtClean="0"/>
+              <a:t>(80</a:t>
+            </a:r>
+            <a:r>
+              <a:rPr lang="en-US" altLang="zh-TW" dirty="0" smtClean="0"/>
+              <a:t>)</a:t>
             </a:r>
           </a:p>
           <a:p>
@@ -6510,8 +6517,13 @@
             </a:r>
             <a:r>
               <a:rPr lang="en-US" altLang="zh-TW" dirty="0" smtClean="0"/>
-              <a:t>(+10)</a:t>
-            </a:r>
+              <a:t>(+</a:t>
+            </a:r>
+            <a:r>
+              <a:rPr lang="en-US" altLang="zh-TW" dirty="0" smtClean="0"/>
+              <a:t>15)</a:t>
+            </a:r>
+            <a:endParaRPr lang="en-US" altLang="zh-TW" dirty="0" smtClean="0"/>
           </a:p>
           <a:p>
             <a:pPr lvl="1"/>
@@ -6658,7 +6670,11 @@
             </a:r>
             <a:r>
               <a:rPr lang="en-US" altLang="zh-TW" dirty="0" smtClean="0"/>
-              <a:t>(70)</a:t>
+              <a:t>(</a:t>
+            </a:r>
+            <a:r>
+              <a:rPr lang="en-US" altLang="zh-TW" dirty="0" smtClean="0"/>
+              <a:t>75)</a:t>
             </a:r>
             <a:endParaRPr lang="en-US" altLang="zh-TW" dirty="0"/>
           </a:p>
@@ -6884,6 +6900,478 @@
     <p:extLst>
       <p:ext uri="{BB962C8B-B14F-4D97-AF65-F5344CB8AC3E}">
         <p14:creationId xmlns:p14="http://schemas.microsoft.com/office/powerpoint/2010/main" val="284720906"/>
+      </p:ext>
+    </p:extLst>
+  </p:cSld>
+  <p:clrMapOvr>
+    <a:masterClrMapping/>
+  </p:clrMapOvr>
+</p:sld>
+</file>
+
+<file path=ppt/slides/slide6.xml><?xml version="1.0" encoding="utf-8"?>
+<p:sld xmlns:a="http://schemas.openxmlformats.org/drawingml/2006/main" xmlns:r="http://schemas.openxmlformats.org/officeDocument/2006/relationships" xmlns:p="http://schemas.openxmlformats.org/presentationml/2006/main">
+  <p:cSld>
+    <p:spTree>
+      <p:nvGrpSpPr>
+        <p:cNvPr id="1" name=""/>
+        <p:cNvGrpSpPr/>
+        <p:nvPr/>
+      </p:nvGrpSpPr>
+      <p:grpSpPr>
+        <a:xfrm>
+          <a:off x="0" y="0"/>
+          <a:ext cx="0" cy="0"/>
+          <a:chOff x="0" y="0"/>
+          <a:chExt cx="0" cy="0"/>
+        </a:xfrm>
+      </p:grpSpPr>
+      <p:sp>
+        <p:nvSpPr>
+          <p:cNvPr id="2" name="標題 1"/>
+          <p:cNvSpPr>
+            <a:spLocks noGrp="1"/>
+          </p:cNvSpPr>
+          <p:nvPr>
+            <p:ph type="title"/>
+          </p:nvPr>
+        </p:nvSpPr>
+        <p:spPr/>
+        <p:txBody>
+          <a:bodyPr/>
+          <a:lstStyle/>
+          <a:p>
+            <a:r>
+              <a:rPr lang="zh-TW" altLang="en-US" dirty="0" smtClean="0"/>
+              <a:t>電子琴</a:t>
+            </a:r>
+            <a:endParaRPr lang="zh-TW" altLang="en-US" dirty="0"/>
+          </a:p>
+        </p:txBody>
+      </p:sp>
+      <p:sp>
+        <p:nvSpPr>
+          <p:cNvPr id="3" name="內容版面配置區 2"/>
+          <p:cNvSpPr>
+            <a:spLocks noGrp="1"/>
+          </p:cNvSpPr>
+          <p:nvPr>
+            <p:ph sz="half" idx="1"/>
+          </p:nvPr>
+        </p:nvSpPr>
+        <p:spPr/>
+        <p:txBody>
+          <a:bodyPr/>
+          <a:lstStyle/>
+          <a:p>
+            <a:r>
+              <a:rPr lang="zh-TW" altLang="en-US" dirty="0" smtClean="0"/>
+              <a:t>基本分：</a:t>
+            </a:r>
+            <a:r>
+              <a:rPr lang="en-US" altLang="zh-TW" dirty="0" smtClean="0"/>
+              <a:t>(60)</a:t>
+            </a:r>
+          </a:p>
+          <a:p>
+            <a:pPr lvl="1"/>
+            <a:r>
+              <a:rPr lang="zh-TW" altLang="en-US" dirty="0" smtClean="0"/>
+              <a:t>按按鈕產生相對應的音調</a:t>
+            </a:r>
+            <a:endParaRPr lang="zh-TW" altLang="en-US" dirty="0"/>
+          </a:p>
+        </p:txBody>
+      </p:sp>
+      <p:sp>
+        <p:nvSpPr>
+          <p:cNvPr id="4" name="內容版面配置區 3"/>
+          <p:cNvSpPr>
+            <a:spLocks noGrp="1"/>
+          </p:cNvSpPr>
+          <p:nvPr>
+            <p:ph sz="half" idx="2"/>
+          </p:nvPr>
+        </p:nvSpPr>
+        <p:spPr/>
+        <p:txBody>
+          <a:bodyPr/>
+          <a:lstStyle/>
+          <a:p>
+            <a:r>
+              <a:rPr lang="zh-TW" altLang="en-US" dirty="0" smtClean="0"/>
+              <a:t>加分題</a:t>
+            </a:r>
+            <a:endParaRPr lang="en-US" altLang="zh-TW" dirty="0" smtClean="0"/>
+          </a:p>
+          <a:p>
+            <a:pPr lvl="1"/>
+            <a:r>
+              <a:rPr lang="zh-TW" altLang="en-US" dirty="0" smtClean="0"/>
+              <a:t>畫一個鍵盤在螢幕上 </a:t>
+            </a:r>
+            <a:r>
+              <a:rPr lang="en-US" altLang="zh-TW" dirty="0" smtClean="0"/>
+              <a:t>(+10)</a:t>
+            </a:r>
+          </a:p>
+          <a:p>
+            <a:pPr lvl="1"/>
+            <a:r>
+              <a:rPr lang="zh-TW" altLang="en-US" dirty="0" smtClean="0"/>
+              <a:t>動畫：卡通圖案隨按鍵在琴鍵上移動 </a:t>
+            </a:r>
+            <a:r>
+              <a:rPr lang="en-US" altLang="zh-TW" dirty="0" smtClean="0"/>
+              <a:t>(+10)</a:t>
+            </a:r>
+            <a:endParaRPr lang="zh-TW" altLang="en-US" dirty="0"/>
+          </a:p>
+        </p:txBody>
+      </p:sp>
+    </p:spTree>
+    <p:extLst>
+      <p:ext uri="{BB962C8B-B14F-4D97-AF65-F5344CB8AC3E}">
+        <p14:creationId xmlns:p14="http://schemas.microsoft.com/office/powerpoint/2010/main" val="3453186324"/>
+      </p:ext>
+    </p:extLst>
+  </p:cSld>
+  <p:clrMapOvr>
+    <a:masterClrMapping/>
+  </p:clrMapOvr>
+</p:sld>
+</file>
+
+<file path=ppt/slides/slide7.xml><?xml version="1.0" encoding="utf-8"?>
+<p:sld xmlns:a="http://schemas.openxmlformats.org/drawingml/2006/main" xmlns:r="http://schemas.openxmlformats.org/officeDocument/2006/relationships" xmlns:p="http://schemas.openxmlformats.org/presentationml/2006/main">
+  <p:cSld>
+    <p:spTree>
+      <p:nvGrpSpPr>
+        <p:cNvPr id="1" name=""/>
+        <p:cNvGrpSpPr/>
+        <p:nvPr/>
+      </p:nvGrpSpPr>
+      <p:grpSpPr>
+        <a:xfrm>
+          <a:off x="0" y="0"/>
+          <a:ext cx="0" cy="0"/>
+          <a:chOff x="0" y="0"/>
+          <a:chExt cx="0" cy="0"/>
+        </a:xfrm>
+      </p:grpSpPr>
+      <p:sp>
+        <p:nvSpPr>
+          <p:cNvPr id="2" name="標題 1"/>
+          <p:cNvSpPr>
+            <a:spLocks noGrp="1"/>
+          </p:cNvSpPr>
+          <p:nvPr>
+            <p:ph type="title"/>
+          </p:nvPr>
+        </p:nvSpPr>
+        <p:spPr/>
+        <p:txBody>
+          <a:bodyPr/>
+          <a:lstStyle/>
+          <a:p>
+            <a:r>
+              <a:rPr lang="zh-TW" altLang="en-US" dirty="0" smtClean="0"/>
+              <a:t>聖誕卡片</a:t>
+            </a:r>
+            <a:endParaRPr lang="zh-TW" altLang="en-US" dirty="0"/>
+          </a:p>
+        </p:txBody>
+      </p:sp>
+      <p:sp>
+        <p:nvSpPr>
+          <p:cNvPr id="3" name="內容版面配置區 2"/>
+          <p:cNvSpPr>
+            <a:spLocks noGrp="1"/>
+          </p:cNvSpPr>
+          <p:nvPr>
+            <p:ph sz="half" idx="1"/>
+          </p:nvPr>
+        </p:nvSpPr>
+        <p:spPr/>
+        <p:txBody>
+          <a:bodyPr/>
+          <a:lstStyle/>
+          <a:p>
+            <a:r>
+              <a:rPr lang="zh-TW" altLang="en-US" dirty="0" smtClean="0"/>
+              <a:t>基本分</a:t>
+            </a:r>
+            <a:r>
+              <a:rPr lang="zh-TW" altLang="en-US" dirty="0">
+                <a:sym typeface="Wingdings" panose="05000000000000000000" pitchFamily="2" charset="2"/>
+              </a:rPr>
+              <a:t> </a:t>
+            </a:r>
+            <a:r>
+              <a:rPr lang="en-US" altLang="zh-TW" dirty="0" smtClean="0">
+                <a:sym typeface="Wingdings" panose="05000000000000000000" pitchFamily="2" charset="2"/>
+              </a:rPr>
+              <a:t>(60)</a:t>
+            </a:r>
+          </a:p>
+          <a:p>
+            <a:pPr lvl="1"/>
+            <a:r>
+              <a:rPr lang="zh-TW" altLang="en-US" dirty="0" smtClean="0">
+                <a:sym typeface="Wingdings" panose="05000000000000000000" pitchFamily="2" charset="2"/>
+              </a:rPr>
+              <a:t>畫一個靜止的圖畫在螢幕</a:t>
+            </a:r>
+            <a:r>
+              <a:rPr lang="zh-TW" altLang="en-US" dirty="0">
+                <a:sym typeface="Wingdings" panose="05000000000000000000" pitchFamily="2" charset="2"/>
+              </a:rPr>
+              <a:t>上</a:t>
+            </a:r>
+            <a:endParaRPr lang="zh-TW" altLang="en-US" dirty="0"/>
+          </a:p>
+        </p:txBody>
+      </p:sp>
+      <p:sp>
+        <p:nvSpPr>
+          <p:cNvPr id="4" name="內容版面配置區 3"/>
+          <p:cNvSpPr>
+            <a:spLocks noGrp="1"/>
+          </p:cNvSpPr>
+          <p:nvPr>
+            <p:ph sz="half" idx="2"/>
+          </p:nvPr>
+        </p:nvSpPr>
+        <p:spPr/>
+        <p:txBody>
+          <a:bodyPr/>
+          <a:lstStyle/>
+          <a:p>
+            <a:r>
+              <a:rPr lang="zh-TW" altLang="en-US" dirty="0" smtClean="0"/>
+              <a:t>加分題：</a:t>
+            </a:r>
+            <a:endParaRPr lang="en-US" altLang="zh-TW" dirty="0" smtClean="0"/>
+          </a:p>
+          <a:p>
+            <a:pPr lvl="1"/>
+            <a:r>
+              <a:rPr lang="zh-TW" altLang="en-US" dirty="0" smtClean="0"/>
+              <a:t>背景音樂 </a:t>
+            </a:r>
+            <a:r>
+              <a:rPr lang="en-US" altLang="zh-TW" dirty="0" smtClean="0"/>
+              <a:t>(+10)</a:t>
+            </a:r>
+          </a:p>
+          <a:p>
+            <a:pPr lvl="1"/>
+            <a:r>
+              <a:rPr lang="zh-TW" altLang="en-US" dirty="0" smtClean="0"/>
+              <a:t>字幕以特效方式進入 </a:t>
+            </a:r>
+            <a:r>
+              <a:rPr lang="en-US" altLang="zh-TW" dirty="0" smtClean="0"/>
+              <a:t>(+10)</a:t>
+            </a:r>
+          </a:p>
+          <a:p>
+            <a:pPr lvl="1"/>
+            <a:r>
+              <a:rPr lang="zh-TW" altLang="en-US" dirty="0" smtClean="0"/>
+              <a:t>放煙火 </a:t>
+            </a:r>
+            <a:r>
+              <a:rPr lang="en-US" altLang="zh-TW" dirty="0" smtClean="0"/>
+              <a:t>(</a:t>
+            </a:r>
+            <a:r>
+              <a:rPr lang="zh-TW" altLang="en-US" dirty="0" smtClean="0"/>
+              <a:t>或任何動畫特效</a:t>
+            </a:r>
+            <a:r>
+              <a:rPr lang="en-US" altLang="zh-TW" dirty="0" smtClean="0"/>
+              <a:t>) (+10)</a:t>
+            </a:r>
+            <a:endParaRPr lang="zh-TW" altLang="en-US" dirty="0"/>
+          </a:p>
+        </p:txBody>
+      </p:sp>
+    </p:spTree>
+    <p:extLst>
+      <p:ext uri="{BB962C8B-B14F-4D97-AF65-F5344CB8AC3E}">
+        <p14:creationId xmlns:p14="http://schemas.microsoft.com/office/powerpoint/2010/main" val="2405767315"/>
+      </p:ext>
+    </p:extLst>
+  </p:cSld>
+  <p:clrMapOvr>
+    <a:masterClrMapping/>
+  </p:clrMapOvr>
+</p:sld>
+</file>
+
+<file path=ppt/slides/slide8.xml><?xml version="1.0" encoding="utf-8"?>
+<p:sld xmlns:a="http://schemas.openxmlformats.org/drawingml/2006/main" xmlns:r="http://schemas.openxmlformats.org/officeDocument/2006/relationships" xmlns:p="http://schemas.openxmlformats.org/presentationml/2006/main">
+  <p:cSld>
+    <p:spTree>
+      <p:nvGrpSpPr>
+        <p:cNvPr id="1" name=""/>
+        <p:cNvGrpSpPr/>
+        <p:nvPr/>
+      </p:nvGrpSpPr>
+      <p:grpSpPr>
+        <a:xfrm>
+          <a:off x="0" y="0"/>
+          <a:ext cx="0" cy="0"/>
+          <a:chOff x="0" y="0"/>
+          <a:chExt cx="0" cy="0"/>
+        </a:xfrm>
+      </p:grpSpPr>
+      <p:sp>
+        <p:nvSpPr>
+          <p:cNvPr id="2" name="標題 1"/>
+          <p:cNvSpPr>
+            <a:spLocks noGrp="1"/>
+          </p:cNvSpPr>
+          <p:nvPr>
+            <p:ph type="title"/>
+          </p:nvPr>
+        </p:nvSpPr>
+        <p:spPr/>
+        <p:txBody>
+          <a:bodyPr/>
+          <a:lstStyle/>
+          <a:p>
+            <a:r>
+              <a:rPr lang="zh-TW" altLang="en-US" dirty="0" smtClean="0"/>
+              <a:t>其他評分項目 </a:t>
+            </a:r>
+            <a:r>
+              <a:rPr lang="en-US" altLang="zh-TW" dirty="0" smtClean="0"/>
+              <a:t>(</a:t>
+            </a:r>
+            <a:r>
+              <a:rPr lang="zh-TW" altLang="en-US" dirty="0" smtClean="0"/>
+              <a:t>所有題目</a:t>
+            </a:r>
+            <a:r>
+              <a:rPr lang="en-US" altLang="zh-TW" dirty="0" smtClean="0"/>
+              <a:t>)</a:t>
+            </a:r>
+            <a:endParaRPr lang="zh-TW" altLang="en-US" dirty="0"/>
+          </a:p>
+        </p:txBody>
+      </p:sp>
+      <p:sp>
+        <p:nvSpPr>
+          <p:cNvPr id="3" name="內容版面配置區 2"/>
+          <p:cNvSpPr>
+            <a:spLocks noGrp="1"/>
+          </p:cNvSpPr>
+          <p:nvPr>
+            <p:ph sz="half" idx="1"/>
+          </p:nvPr>
+        </p:nvSpPr>
+        <p:spPr/>
+        <p:txBody>
+          <a:bodyPr/>
+          <a:lstStyle/>
+          <a:p>
+            <a:r>
+              <a:rPr lang="zh-TW" altLang="en-US" dirty="0" smtClean="0"/>
+              <a:t>靜止畫面美觀 </a:t>
+            </a:r>
+            <a:r>
+              <a:rPr lang="en-US" altLang="zh-TW" dirty="0" smtClean="0"/>
+              <a:t>(0 – 10 </a:t>
+            </a:r>
+            <a:r>
+              <a:rPr lang="zh-TW" altLang="en-US" dirty="0" smtClean="0"/>
+              <a:t>分</a:t>
+            </a:r>
+            <a:r>
+              <a:rPr lang="en-US" altLang="zh-TW" dirty="0" smtClean="0"/>
+              <a:t>)</a:t>
+            </a:r>
+          </a:p>
+          <a:p>
+            <a:pPr lvl="1"/>
+            <a:r>
+              <a:rPr lang="zh-TW" altLang="en-US" dirty="0" smtClean="0"/>
+              <a:t>助教主觀評分</a:t>
+            </a:r>
+            <a:endParaRPr lang="en-US" altLang="zh-TW" dirty="0" smtClean="0"/>
+          </a:p>
+          <a:p>
+            <a:r>
+              <a:rPr lang="zh-TW" altLang="en-US" dirty="0" smtClean="0"/>
+              <a:t>移動 </a:t>
+            </a:r>
+            <a:r>
+              <a:rPr lang="en-US" altLang="zh-TW" dirty="0" smtClean="0"/>
+              <a:t>(</a:t>
+            </a:r>
+            <a:r>
+              <a:rPr lang="zh-TW" altLang="en-US" dirty="0" smtClean="0"/>
+              <a:t>小</a:t>
+            </a:r>
+            <a:r>
+              <a:rPr lang="en-US" altLang="zh-TW" dirty="0" smtClean="0"/>
+              <a:t>) </a:t>
+            </a:r>
+            <a:r>
+              <a:rPr lang="zh-TW" altLang="en-US" dirty="0" smtClean="0"/>
+              <a:t>物件美觀 </a:t>
+            </a:r>
+            <a:r>
+              <a:rPr lang="en-US" altLang="zh-TW" dirty="0" smtClean="0"/>
+              <a:t>(0 – 5 </a:t>
+            </a:r>
+            <a:r>
+              <a:rPr lang="zh-TW" altLang="en-US" dirty="0" smtClean="0"/>
+              <a:t>分</a:t>
+            </a:r>
+            <a:r>
+              <a:rPr lang="en-US" altLang="zh-TW" dirty="0" smtClean="0"/>
+              <a:t>)</a:t>
+            </a:r>
+          </a:p>
+          <a:p>
+            <a:pPr lvl="1"/>
+            <a:r>
+              <a:rPr lang="zh-TW" altLang="en-US" dirty="0" smtClean="0"/>
+              <a:t>助教主觀</a:t>
+            </a:r>
+            <a:r>
+              <a:rPr lang="zh-TW" altLang="en-US" dirty="0"/>
+              <a:t>評分</a:t>
+            </a:r>
+          </a:p>
+        </p:txBody>
+      </p:sp>
+      <p:sp>
+        <p:nvSpPr>
+          <p:cNvPr id="4" name="內容版面配置區 3"/>
+          <p:cNvSpPr>
+            <a:spLocks noGrp="1"/>
+          </p:cNvSpPr>
+          <p:nvPr>
+            <p:ph sz="half" idx="2"/>
+          </p:nvPr>
+        </p:nvSpPr>
+        <p:spPr/>
+        <p:txBody>
+          <a:bodyPr/>
+          <a:lstStyle/>
+          <a:p>
+            <a:endParaRPr lang="zh-TW" altLang="en-US"/>
+          </a:p>
+        </p:txBody>
+      </p:sp>
+    </p:spTree>
+    <p:extLst>
+      <p:ext uri="{BB962C8B-B14F-4D97-AF65-F5344CB8AC3E}">
+        <p14:creationId xmlns:p14="http://schemas.microsoft.com/office/powerpoint/2010/main" val="700090937"/>
       </p:ext>
     </p:extLst>
   </p:cSld>

</xml_diff>